<commit_message>
updaet for NVRAMOS 2024
</commit_message>
<xml_diff>
--- a/template.pptx
+++ b/template.pptx
@@ -208,7 +208,7 @@
           <a:p>
             <a:fld id="{9E89C4A8-DC1C-4AFC-9260-E953FDC4CEF3}" type="datetimeFigureOut">
               <a:rPr lang="ko-KR" altLang="en-US" smtClean="0"/>
-              <a:t>2023. 10. 17.</a:t>
+              <a:t>2024. 8. 2.</a:t>
             </a:fld>
             <a:endParaRPr lang="ko-KR" altLang="en-US"/>
           </a:p>
@@ -690,7 +690,7 @@
           <a:p>
             <a:fld id="{0A438C46-0BF0-AF42-9FD7-651246E16C9E}" type="datetimeFigureOut">
               <a:rPr kumimoji="1" lang="ko-KR" altLang="en-US" smtClean="0"/>
-              <a:t>2023. 10. 17.</a:t>
+              <a:t>2024. 8. 2.</a:t>
             </a:fld>
             <a:endParaRPr kumimoji="1" lang="ko-KR" altLang="en-US"/>
           </a:p>
@@ -855,7 +855,7 @@
           <a:p>
             <a:fld id="{0A438C46-0BF0-AF42-9FD7-651246E16C9E}" type="datetimeFigureOut">
               <a:rPr kumimoji="1" lang="ko-KR" altLang="en-US" smtClean="0"/>
-              <a:t>2023. 10. 17.</a:t>
+              <a:t>2024. 8. 2.</a:t>
             </a:fld>
             <a:endParaRPr kumimoji="1" lang="ko-KR" altLang="en-US"/>
           </a:p>
@@ -1030,7 +1030,7 @@
           <a:p>
             <a:fld id="{0A438C46-0BF0-AF42-9FD7-651246E16C9E}" type="datetimeFigureOut">
               <a:rPr kumimoji="1" lang="ko-KR" altLang="en-US" smtClean="0"/>
-              <a:t>2023. 10. 17.</a:t>
+              <a:t>2024. 8. 2.</a:t>
             </a:fld>
             <a:endParaRPr kumimoji="1" lang="ko-KR" altLang="en-US"/>
           </a:p>
@@ -1195,7 +1195,7 @@
           <a:p>
             <a:fld id="{0A438C46-0BF0-AF42-9FD7-651246E16C9E}" type="datetimeFigureOut">
               <a:rPr kumimoji="1" lang="ko-KR" altLang="en-US" smtClean="0"/>
-              <a:t>2023. 10. 17.</a:t>
+              <a:t>2024. 8. 2.</a:t>
             </a:fld>
             <a:endParaRPr kumimoji="1" lang="ko-KR" altLang="en-US"/>
           </a:p>
@@ -1434,7 +1434,7 @@
           <a:p>
             <a:fld id="{0A438C46-0BF0-AF42-9FD7-651246E16C9E}" type="datetimeFigureOut">
               <a:rPr kumimoji="1" lang="ko-KR" altLang="en-US" smtClean="0"/>
-              <a:t>2023. 10. 17.</a:t>
+              <a:t>2024. 8. 2.</a:t>
             </a:fld>
             <a:endParaRPr kumimoji="1" lang="ko-KR" altLang="en-US"/>
           </a:p>
@@ -1661,7 +1661,7 @@
           <a:p>
             <a:fld id="{0A438C46-0BF0-AF42-9FD7-651246E16C9E}" type="datetimeFigureOut">
               <a:rPr kumimoji="1" lang="ko-KR" altLang="en-US" smtClean="0"/>
-              <a:t>2023. 10. 17.</a:t>
+              <a:t>2024. 8. 2.</a:t>
             </a:fld>
             <a:endParaRPr kumimoji="1" lang="ko-KR" altLang="en-US"/>
           </a:p>
@@ -2023,7 +2023,7 @@
           <a:p>
             <a:fld id="{0A438C46-0BF0-AF42-9FD7-651246E16C9E}" type="datetimeFigureOut">
               <a:rPr kumimoji="1" lang="ko-KR" altLang="en-US" smtClean="0"/>
-              <a:t>2023. 10. 17.</a:t>
+              <a:t>2024. 8. 2.</a:t>
             </a:fld>
             <a:endParaRPr kumimoji="1" lang="ko-KR" altLang="en-US"/>
           </a:p>
@@ -2136,7 +2136,7 @@
           <a:p>
             <a:fld id="{0A438C46-0BF0-AF42-9FD7-651246E16C9E}" type="datetimeFigureOut">
               <a:rPr kumimoji="1" lang="ko-KR" altLang="en-US" smtClean="0"/>
-              <a:t>2023. 10. 17.</a:t>
+              <a:t>2024. 8. 2.</a:t>
             </a:fld>
             <a:endParaRPr kumimoji="1" lang="ko-KR" altLang="en-US"/>
           </a:p>
@@ -2226,7 +2226,7 @@
           <a:p>
             <a:fld id="{0A438C46-0BF0-AF42-9FD7-651246E16C9E}" type="datetimeFigureOut">
               <a:rPr kumimoji="1" lang="ko-KR" altLang="en-US" smtClean="0"/>
-              <a:t>2023. 10. 17.</a:t>
+              <a:t>2024. 8. 2.</a:t>
             </a:fld>
             <a:endParaRPr kumimoji="1" lang="ko-KR" altLang="en-US"/>
           </a:p>
@@ -2498,7 +2498,7 @@
           <a:p>
             <a:fld id="{0A438C46-0BF0-AF42-9FD7-651246E16C9E}" type="datetimeFigureOut">
               <a:rPr kumimoji="1" lang="ko-KR" altLang="en-US" smtClean="0"/>
-              <a:t>2023. 10. 17.</a:t>
+              <a:t>2024. 8. 2.</a:t>
             </a:fld>
             <a:endParaRPr kumimoji="1" lang="ko-KR" altLang="en-US"/>
           </a:p>
@@ -2750,7 +2750,7 @@
           <a:p>
             <a:fld id="{0A438C46-0BF0-AF42-9FD7-651246E16C9E}" type="datetimeFigureOut">
               <a:rPr kumimoji="1" lang="ko-KR" altLang="en-US" smtClean="0"/>
-              <a:t>2023. 10. 17.</a:t>
+              <a:t>2024. 8. 2.</a:t>
             </a:fld>
             <a:endParaRPr kumimoji="1" lang="ko-KR" altLang="en-US"/>
           </a:p>
@@ -2958,7 +2958,7 @@
           <a:p>
             <a:fld id="{0A438C46-0BF0-AF42-9FD7-651246E16C9E}" type="datetimeFigureOut">
               <a:rPr kumimoji="1" lang="ko-KR" altLang="en-US" smtClean="0"/>
-              <a:t>2023. 10. 17.</a:t>
+              <a:t>2024. 8. 2.</a:t>
             </a:fld>
             <a:endParaRPr kumimoji="1" lang="ko-KR" altLang="en-US"/>
           </a:p>
@@ -3508,6 +3508,17 @@
           <a:lstStyle/>
           <a:p>
             <a:r>
+              <a:rPr kumimoji="1" lang="en-US" altLang="ko-KR" b="1" dirty="0" err="1">
+                <a:solidFill>
+                  <a:schemeClr val="bg1"/>
+                </a:solidFill>
+                <a:latin typeface="Arial" charset="0"/>
+                <a:ea typeface="Arial" charset="0"/>
+                <a:cs typeface="Arial" charset="0"/>
+              </a:rPr>
+              <a:t>NVRAMOS</a:t>
+            </a:r>
+            <a:r>
               <a:rPr kumimoji="1" lang="en-US" altLang="ko-KR" b="1" dirty="0">
                 <a:solidFill>
                   <a:schemeClr val="bg1"/>
@@ -3516,7 +3527,7 @@
                 <a:ea typeface="Arial" charset="0"/>
                 <a:cs typeface="Arial" charset="0"/>
               </a:rPr>
-              <a:t>NVRAMOS 2023</a:t>
+              <a:t> 2024</a:t>
             </a:r>
           </a:p>
           <a:p>
@@ -3555,7 +3566,7 @@
                 <a:ea typeface="Arial" charset="0"/>
                 <a:cs typeface="Arial" charset="0"/>
               </a:rPr>
-              <a:t>Oct 19-21, 2023, </a:t>
+              <a:t>Oct 24-26, 2024, </a:t>
             </a:r>
             <a:r>
               <a:rPr kumimoji="1" lang="en-US" altLang="ko-KR" sz="1000" b="1" dirty="0" err="1">
@@ -3814,6 +3825,17 @@
           <a:lstStyle/>
           <a:p>
             <a:r>
+              <a:rPr kumimoji="1" lang="en-US" altLang="ko-KR" b="1" dirty="0" err="1">
+                <a:solidFill>
+                  <a:schemeClr val="bg1"/>
+                </a:solidFill>
+                <a:latin typeface="Arial" charset="0"/>
+                <a:ea typeface="Arial" charset="0"/>
+                <a:cs typeface="Arial" charset="0"/>
+              </a:rPr>
+              <a:t>NVRAMOS</a:t>
+            </a:r>
+            <a:r>
               <a:rPr kumimoji="1" lang="en-US" altLang="ko-KR" b="1" dirty="0">
                 <a:solidFill>
                   <a:schemeClr val="bg1"/>
@@ -3822,7 +3844,7 @@
                 <a:ea typeface="Arial" charset="0"/>
                 <a:cs typeface="Arial" charset="0"/>
               </a:rPr>
-              <a:t>NVRAMOS 2023</a:t>
+              <a:t> 2024</a:t>
             </a:r>
           </a:p>
           <a:p>
@@ -3907,7 +3929,7 @@
                 <a:ea typeface="Arial" charset="0"/>
                 <a:cs typeface="Arial" charset="0"/>
               </a:rPr>
-              <a:t>Oct 19-21, 2023, </a:t>
+              <a:t>Oct 24-26, 2024, </a:t>
             </a:r>
             <a:r>
               <a:rPr kumimoji="1" lang="en-US" altLang="ko-KR" sz="1000" b="1" dirty="0" err="1">
@@ -4225,7 +4247,7 @@
                 <a:ea typeface="Arial" charset="0"/>
                 <a:cs typeface="Arial" charset="0"/>
               </a:rPr>
-              <a:t>2023</a:t>
+              <a:t>2024</a:t>
             </a:r>
             <a:endParaRPr kumimoji="1" lang="en-US" altLang="ko-KR" sz="1800" b="1" i="0" u="none" strike="noStrike" kern="1200" cap="none" spc="0" normalizeH="0" baseline="0" noProof="0" dirty="0">
               <a:ln>
@@ -4324,7 +4346,7 @@
                 <a:ea typeface="Arial" charset="0"/>
                 <a:cs typeface="Arial" charset="0"/>
               </a:rPr>
-              <a:t>Oct 19-21, 2023, </a:t>
+              <a:t>Oct 24-26, 2024, </a:t>
             </a:r>
             <a:r>
               <a:rPr kumimoji="1" lang="en-US" altLang="ko-KR" sz="1000" b="1" dirty="0" err="1">
@@ -4642,7 +4664,7 @@
                 <a:ea typeface="Arial" charset="0"/>
                 <a:cs typeface="Arial" charset="0"/>
               </a:rPr>
-              <a:t>2023</a:t>
+              <a:t>2024</a:t>
             </a:r>
             <a:endParaRPr kumimoji="1" lang="en-US" altLang="ko-KR" sz="1800" b="1" i="0" u="none" strike="noStrike" kern="1200" cap="none" spc="0" normalizeH="0" baseline="0" noProof="0" dirty="0">
               <a:ln>
@@ -4741,7 +4763,7 @@
                 <a:ea typeface="Arial" charset="0"/>
                 <a:cs typeface="Arial" charset="0"/>
               </a:rPr>
-              <a:t>Oct 19-21, 2023, </a:t>
+              <a:t>Oct 24-26, 2024, </a:t>
             </a:r>
             <a:r>
               <a:rPr kumimoji="1" lang="en-US" altLang="ko-KR" sz="1000" b="1" dirty="0" err="1">

</xml_diff>